<commit_message>
re: improving wooden procedural furniture
</commit_message>
<xml_diff>
--- a/img/re/furnitures/furniture_lifecycle.pptx
+++ b/img/re/furnitures/furniture_lifecycle.pptx
@@ -243,7 +243,7 @@
           <a:p>
             <a:fld id="{148C25D2-2162-4ABB-B8CC-F09758D70EE0}" type="datetimeFigureOut">
               <a:rPr lang="fr-FR" smtClean="0"/>
-              <a:t>11/12/2017</a:t>
+              <a:t>12/12/2017</a:t>
             </a:fld>
             <a:endParaRPr lang="fr-FR"/>
           </a:p>
@@ -413,7 +413,7 @@
           <a:p>
             <a:fld id="{148C25D2-2162-4ABB-B8CC-F09758D70EE0}" type="datetimeFigureOut">
               <a:rPr lang="fr-FR" smtClean="0"/>
-              <a:t>11/12/2017</a:t>
+              <a:t>12/12/2017</a:t>
             </a:fld>
             <a:endParaRPr lang="fr-FR"/>
           </a:p>
@@ -593,7 +593,7 @@
           <a:p>
             <a:fld id="{148C25D2-2162-4ABB-B8CC-F09758D70EE0}" type="datetimeFigureOut">
               <a:rPr lang="fr-FR" smtClean="0"/>
-              <a:t>11/12/2017</a:t>
+              <a:t>12/12/2017</a:t>
             </a:fld>
             <a:endParaRPr lang="fr-FR"/>
           </a:p>
@@ -763,7 +763,7 @@
           <a:p>
             <a:fld id="{148C25D2-2162-4ABB-B8CC-F09758D70EE0}" type="datetimeFigureOut">
               <a:rPr lang="fr-FR" smtClean="0"/>
-              <a:t>11/12/2017</a:t>
+              <a:t>12/12/2017</a:t>
             </a:fld>
             <a:endParaRPr lang="fr-FR"/>
           </a:p>
@@ -1009,7 +1009,7 @@
           <a:p>
             <a:fld id="{148C25D2-2162-4ABB-B8CC-F09758D70EE0}" type="datetimeFigureOut">
               <a:rPr lang="fr-FR" smtClean="0"/>
-              <a:t>11/12/2017</a:t>
+              <a:t>12/12/2017</a:t>
             </a:fld>
             <a:endParaRPr lang="fr-FR"/>
           </a:p>
@@ -1241,7 +1241,7 @@
           <a:p>
             <a:fld id="{148C25D2-2162-4ABB-B8CC-F09758D70EE0}" type="datetimeFigureOut">
               <a:rPr lang="fr-FR" smtClean="0"/>
-              <a:t>11/12/2017</a:t>
+              <a:t>12/12/2017</a:t>
             </a:fld>
             <a:endParaRPr lang="fr-FR"/>
           </a:p>
@@ -1608,7 +1608,7 @@
           <a:p>
             <a:fld id="{148C25D2-2162-4ABB-B8CC-F09758D70EE0}" type="datetimeFigureOut">
               <a:rPr lang="fr-FR" smtClean="0"/>
-              <a:t>11/12/2017</a:t>
+              <a:t>12/12/2017</a:t>
             </a:fld>
             <a:endParaRPr lang="fr-FR"/>
           </a:p>
@@ -1726,7 +1726,7 @@
           <a:p>
             <a:fld id="{148C25D2-2162-4ABB-B8CC-F09758D70EE0}" type="datetimeFigureOut">
               <a:rPr lang="fr-FR" smtClean="0"/>
-              <a:t>11/12/2017</a:t>
+              <a:t>12/12/2017</a:t>
             </a:fld>
             <a:endParaRPr lang="fr-FR"/>
           </a:p>
@@ -1821,7 +1821,7 @@
           <a:p>
             <a:fld id="{148C25D2-2162-4ABB-B8CC-F09758D70EE0}" type="datetimeFigureOut">
               <a:rPr lang="fr-FR" smtClean="0"/>
-              <a:t>11/12/2017</a:t>
+              <a:t>12/12/2017</a:t>
             </a:fld>
             <a:endParaRPr lang="fr-FR"/>
           </a:p>
@@ -2098,7 +2098,7 @@
           <a:p>
             <a:fld id="{148C25D2-2162-4ABB-B8CC-F09758D70EE0}" type="datetimeFigureOut">
               <a:rPr lang="fr-FR" smtClean="0"/>
-              <a:t>11/12/2017</a:t>
+              <a:t>12/12/2017</a:t>
             </a:fld>
             <a:endParaRPr lang="fr-FR"/>
           </a:p>
@@ -2351,7 +2351,7 @@
           <a:p>
             <a:fld id="{148C25D2-2162-4ABB-B8CC-F09758D70EE0}" type="datetimeFigureOut">
               <a:rPr lang="fr-FR" smtClean="0"/>
-              <a:t>11/12/2017</a:t>
+              <a:t>12/12/2017</a:t>
             </a:fld>
             <a:endParaRPr lang="fr-FR"/>
           </a:p>
@@ -2564,7 +2564,7 @@
           <a:p>
             <a:fld id="{148C25D2-2162-4ABB-B8CC-F09758D70EE0}" type="datetimeFigureOut">
               <a:rPr lang="fr-FR" smtClean="0"/>
-              <a:t>11/12/2017</a:t>
+              <a:t>12/12/2017</a:t>
             </a:fld>
             <a:endParaRPr lang="fr-FR"/>
           </a:p>
@@ -3045,7 +3045,7 @@
                 </a:pPr>
                 <a:r>
                   <a:rPr lang="en-US" dirty="0" smtClean="0"/>
-                  <a:t>Ideas</a:t>
+                  <a:t>Ideas,</a:t>
                 </a:r>
                 <a:r>
                   <a:rPr lang="fr-FR" dirty="0" smtClean="0"/>
@@ -3056,7 +3056,7 @@
                 </a:br>
                 <a:r>
                   <a:rPr lang="fr-FR" dirty="0" smtClean="0"/>
-                  <a:t>ne</a:t>
+                  <a:t>Ne</a:t>
                 </a:r>
                 <a:r>
                   <a:rPr lang="en-GB" dirty="0" smtClean="0"/>
@@ -3064,8 +3064,9 @@
                 </a:r>
                 <a:r>
                   <a:rPr lang="en-US" dirty="0" smtClean="0"/>
-                  <a:t>ds</a:t>
+                  <a:t>ds,</a:t>
                 </a:r>
+                <a:endParaRPr lang="en-US" dirty="0" smtClean="0"/>
               </a:p>
               <a:p>
                 <a:pPr algn="ctr">
@@ -3075,7 +3076,7 @@
                 </a:pPr>
                 <a:r>
                   <a:rPr lang="fr-FR" dirty="0" err="1" smtClean="0"/>
-                  <a:t>requirements</a:t>
+                  <a:t>Requirements</a:t>
                 </a:r>
                 <a:endParaRPr lang="fr-FR" dirty="0"/>
               </a:p>
@@ -3133,9 +3134,10 @@
                   </a:lnSpc>
                 </a:pPr>
                 <a:r>
-                  <a:rPr lang="en-US" dirty="0"/>
-                  <a:t>Materials</a:t>
+                  <a:rPr lang="en-US" dirty="0" smtClean="0"/>
+                  <a:t>Materials,</a:t>
                 </a:r>
+                <a:endParaRPr lang="en-US" dirty="0"/>
               </a:p>
               <a:p>
                 <a:pPr algn="ctr">
@@ -3145,7 +3147,11 @@
                 </a:pPr>
                 <a:r>
                   <a:rPr lang="en-US" dirty="0" err="1"/>
-                  <a:t>dimensionning</a:t>
+                  <a:t>D</a:t>
+                </a:r>
+                <a:r>
+                  <a:rPr lang="en-US" dirty="0" err="1" smtClean="0"/>
+                  <a:t>imensionning</a:t>
                 </a:r>
                 <a:endParaRPr lang="en-US" dirty="0"/>
               </a:p>
@@ -3262,17 +3268,21 @@
                   </a:lnSpc>
                 </a:pPr>
                 <a:r>
-                  <a:rPr lang="fr-FR" dirty="0"/>
-                  <a:t>Plans/</a:t>
+                  <a:rPr lang="fr-FR" dirty="0" smtClean="0"/>
+                  <a:t>Model,</a:t>
                 </a:r>
-                <a:br>
-                  <a:rPr lang="fr-FR" dirty="0"/>
-                </a:br>
+              </a:p>
+              <a:p>
+                <a:pPr algn="ctr">
+                  <a:lnSpc>
+                    <a:spcPts val="2000"/>
+                  </a:lnSpc>
+                </a:pPr>
                 <a:r>
-                  <a:rPr lang="fr-FR" dirty="0"/>
-                  <a:t>model</a:t>
+                  <a:rPr lang="fr-FR" dirty="0" smtClean="0"/>
+                  <a:t>Plans</a:t>
                 </a:r>
-                <a:endParaRPr lang="fr-FR" dirty="0"/>
+                <a:endParaRPr lang="fr-FR" dirty="0" smtClean="0"/>
               </a:p>
             </p:txBody>
           </p:sp>
@@ -3328,9 +3338,10 @@
                   </a:lnSpc>
                 </a:pPr>
                 <a:r>
-                  <a:rPr lang="fr-FR" dirty="0"/>
-                  <a:t>Nomenclature</a:t>
+                  <a:rPr lang="fr-FR" dirty="0" smtClean="0"/>
+                  <a:t>Nomenclature,</a:t>
                 </a:r>
+                <a:endParaRPr lang="fr-FR" dirty="0"/>
               </a:p>
               <a:p>
                 <a:pPr algn="ctr">
@@ -3480,7 +3491,11 @@
                 </a:pPr>
                 <a:r>
                   <a:rPr lang="fr-FR" dirty="0" err="1"/>
-                  <a:t>markings</a:t>
+                  <a:t>M</a:t>
+                </a:r>
+                <a:r>
+                  <a:rPr lang="fr-FR" dirty="0" err="1" smtClean="0"/>
+                  <a:t>arkings</a:t>
                 </a:r>
                 <a:endParaRPr lang="fr-FR" dirty="0"/>
               </a:p>
@@ -3536,7 +3551,6 @@
                   <a:rPr lang="fr-FR" dirty="0"/>
                   <a:t>Cut to dimension</a:t>
                 </a:r>
-                <a:endParaRPr lang="fr-FR" dirty="0"/>
               </a:p>
             </p:txBody>
           </p:sp>
@@ -3595,7 +3609,6 @@
                   <a:rPr lang="fr-FR" dirty="0"/>
                   <a:t>Joins</a:t>
                 </a:r>
-                <a:endParaRPr lang="fr-FR" dirty="0"/>
               </a:p>
             </p:txBody>
           </p:sp>
@@ -3652,7 +3665,11 @@
                 </a:pPr>
                 <a:r>
                   <a:rPr lang="fr-FR" dirty="0" err="1"/>
-                  <a:t>gluing</a:t>
+                  <a:t>G</a:t>
+                </a:r>
+                <a:r>
+                  <a:rPr lang="fr-FR" dirty="0" err="1" smtClean="0"/>
+                  <a:t>luing</a:t>
                 </a:r>
                 <a:endParaRPr lang="fr-FR" dirty="0"/>
               </a:p>
@@ -3711,7 +3728,11 @@
                 </a:pPr>
                 <a:r>
                   <a:rPr lang="fr-FR" dirty="0" err="1"/>
-                  <a:t>finishings</a:t>
+                  <a:t>F</a:t>
+                </a:r>
+                <a:r>
+                  <a:rPr lang="fr-FR" dirty="0" err="1" smtClean="0"/>
+                  <a:t>inishings</a:t>
                 </a:r>
                 <a:endParaRPr lang="fr-FR" dirty="0"/>
               </a:p>
@@ -3844,7 +3865,11 @@
                 </a:pPr>
                 <a:r>
                   <a:rPr lang="fr-FR" dirty="0"/>
-                  <a:t>transport</a:t>
+                  <a:t>T</a:t>
+                </a:r>
+                <a:r>
+                  <a:rPr lang="fr-FR" dirty="0" smtClean="0"/>
+                  <a:t>ransport</a:t>
                 </a:r>
                 <a:endParaRPr lang="fr-FR" dirty="0"/>
               </a:p>
@@ -3902,8 +3927,12 @@
                   </a:lnSpc>
                 </a:pPr>
                 <a:r>
-                  <a:rPr lang="fr-FR" dirty="0" err="1"/>
-                  <a:t>install</a:t>
+                  <a:rPr lang="fr-FR" dirty="0"/>
+                  <a:t>I</a:t>
+                </a:r>
+                <a:r>
+                  <a:rPr lang="fr-FR" dirty="0" smtClean="0"/>
+                  <a:t>nstall</a:t>
                 </a:r>
                 <a:endParaRPr lang="fr-FR" dirty="0"/>
               </a:p>
@@ -3957,7 +3986,11 @@
                 </a:pPr>
                 <a:r>
                   <a:rPr lang="fr-FR" dirty="0"/>
-                  <a:t>usage</a:t>
+                  <a:t>U</a:t>
+                </a:r>
+                <a:r>
+                  <a:rPr lang="fr-FR" dirty="0" smtClean="0"/>
+                  <a:t>sage</a:t>
                 </a:r>
                 <a:endParaRPr lang="fr-FR" dirty="0"/>
               </a:p>
@@ -4016,8 +4049,13 @@
                 </a:pPr>
                 <a:r>
                   <a:rPr lang="fr-FR" dirty="0"/>
-                  <a:t>maintenance</a:t>
+                  <a:t>M</a:t>
                 </a:r>
+                <a:r>
+                  <a:rPr lang="fr-FR" dirty="0" smtClean="0"/>
+                  <a:t>aintenance</a:t>
+                </a:r>
+                <a:endParaRPr lang="fr-FR" dirty="0"/>
               </a:p>
             </p:txBody>
           </p:sp>
@@ -4136,8 +4174,8 @@
                 </a:lnSpc>
               </a:pPr>
               <a:r>
-                <a:rPr lang="fr-FR" dirty="0"/>
-                <a:t>fabrication </a:t>
+                <a:rPr lang="fr-FR" dirty="0" smtClean="0"/>
+                <a:t>Fabrication </a:t>
               </a:r>
               <a:r>
                 <a:rPr lang="fr-FR" dirty="0" err="1"/>

</xml_diff>